<commit_message>
csv files removed, data source added to Readme
</commit_message>
<xml_diff>
--- a/payment_aggregator/fraud_case - report.pptx
+++ b/payment_aggregator/fraud_case - report.pptx
@@ -350,7 +350,7 @@
           <a:p>
             <a:fld id="{9AB3A824-1A51-4B26-AD58-A6D8E14F6C04}" type="datetimeFigureOut">
               <a:rPr lang="en-US" smtClean="0"/>
-              <a:t>2/17/2022</a:t>
+              <a:t>3/18/2022</a:t>
             </a:fld>
             <a:endParaRPr lang="en-US" dirty="0"/>
           </a:p>
@@ -563,7 +563,7 @@
           <a:p>
             <a:fld id="{D857E33E-8B18-4087-B112-809917729534}" type="datetimeFigureOut">
               <a:rPr lang="en-US" smtClean="0"/>
-              <a:t>2/17/2022</a:t>
+              <a:t>3/18/2022</a:t>
             </a:fld>
             <a:endParaRPr lang="en-US" dirty="0"/>
           </a:p>
@@ -824,7 +824,7 @@
           <a:p>
             <a:fld id="{D3FFE419-2371-464F-8239-3959401C3561}" type="datetimeFigureOut">
               <a:rPr lang="en-US" smtClean="0"/>
-              <a:t>2/17/2022</a:t>
+              <a:t>3/18/2022</a:t>
             </a:fld>
             <a:endParaRPr lang="en-US" dirty="0"/>
           </a:p>
@@ -1003,7 +1003,7 @@
           <a:p>
             <a:fld id="{97D162C4-EDD9-4389-A98B-B87ECEA2A816}" type="datetimeFigureOut">
               <a:rPr lang="en-US" smtClean="0"/>
-              <a:t>2/17/2022</a:t>
+              <a:t>3/18/2022</a:t>
             </a:fld>
             <a:endParaRPr lang="en-US" dirty="0"/>
           </a:p>
@@ -1351,7 +1351,7 @@
           <a:p>
             <a:fld id="{3E5059C3-6A89-4494-99FF-5A4D6FFD50EB}" type="datetimeFigureOut">
               <a:rPr lang="en-US" smtClean="0"/>
-              <a:t>2/17/2022</a:t>
+              <a:t>3/18/2022</a:t>
             </a:fld>
             <a:endParaRPr lang="en-US" dirty="0"/>
           </a:p>
@@ -1631,7 +1631,7 @@
           <a:p>
             <a:fld id="{CA954B2F-12DE-47F5-8894-472B206D2E1E}" type="datetimeFigureOut">
               <a:rPr lang="en-US" smtClean="0"/>
-              <a:t>2/17/2022</a:t>
+              <a:t>3/18/2022</a:t>
             </a:fld>
             <a:endParaRPr lang="en-US" dirty="0"/>
           </a:p>
@@ -2015,7 +2015,7 @@
           <a:p>
             <a:fld id="{3F30E46F-7819-4ACF-B48B-48222C2ACC88}" type="datetimeFigureOut">
               <a:rPr lang="en-US" smtClean="0"/>
-              <a:t>2/17/2022</a:t>
+              <a:t>3/18/2022</a:t>
             </a:fld>
             <a:endParaRPr lang="en-US" dirty="0"/>
           </a:p>
@@ -2138,7 +2138,7 @@
           <a:p>
             <a:fld id="{1FAF3416-4057-4DAA-829D-4CA07428D088}" type="datetimeFigureOut">
               <a:rPr lang="en-US" smtClean="0"/>
-              <a:t>2/17/2022</a:t>
+              <a:t>3/18/2022</a:t>
             </a:fld>
             <a:endParaRPr lang="en-US" dirty="0"/>
           </a:p>
@@ -2314,7 +2314,7 @@
           <a:p>
             <a:fld id="{921D9284-D300-4297-87F7-E791DCC15DB1}" type="datetimeFigureOut">
               <a:rPr lang="en-US" smtClean="0"/>
-              <a:t>2/17/2022</a:t>
+              <a:t>3/18/2022</a:t>
             </a:fld>
             <a:endParaRPr lang="en-US" dirty="0"/>
           </a:p>
@@ -2673,7 +2673,7 @@
           <a:p>
             <a:fld id="{37D525BB-DA17-4BA0-B3C8-3AC3ABC827E6}" type="datetimeFigureOut">
               <a:rPr lang="en-US" smtClean="0"/>
-              <a:t>2/17/2022</a:t>
+              <a:t>3/18/2022</a:t>
             </a:fld>
             <a:endParaRPr lang="en-US" dirty="0"/>
           </a:p>
@@ -3060,7 +3060,7 @@
           <a:p>
             <a:fld id="{B16C4C9A-3960-41CF-A4E9-2A8FB932454B}" type="datetimeFigureOut">
               <a:rPr lang="en-US" smtClean="0"/>
-              <a:t>2/17/2022</a:t>
+              <a:t>3/18/2022</a:t>
             </a:fld>
             <a:endParaRPr lang="en-US" dirty="0"/>
           </a:p>
@@ -3352,7 +3352,7 @@
           <a:p>
             <a:fld id="{3CBC1C18-307B-4F68-A007-B5B542270E8D}" type="datetimeFigureOut">
               <a:rPr lang="en-US" smtClean="0"/>
-              <a:t>2/17/2022</a:t>
+              <a:t>3/18/2022</a:t>
             </a:fld>
             <a:endParaRPr lang="en-US" dirty="0"/>
           </a:p>
@@ -3944,53 +3944,6 @@
           </a:p>
         </p:txBody>
       </p:sp>
-      <p:pic>
-        <p:nvPicPr>
-          <p:cNvPr id="1026" name="Picture 2" descr="Clip informa">
-            <a:extLst>
-              <a:ext uri="{FF2B5EF4-FFF2-40B4-BE49-F238E27FC236}">
-                <a16:creationId xmlns:a16="http://schemas.microsoft.com/office/drawing/2014/main" id="{34312472-AE50-4504-B3D6-B92849779FEF}"/>
-              </a:ext>
-            </a:extLst>
-          </p:cNvPr>
-          <p:cNvPicPr>
-            <a:picLocks noChangeAspect="1" noChangeArrowheads="1"/>
-          </p:cNvPicPr>
-          <p:nvPr/>
-        </p:nvPicPr>
-        <p:blipFill>
-          <a:blip r:embed="rId2">
-            <a:extLst>
-              <a:ext uri="{28A0092B-C50C-407E-A947-70E740481C1C}">
-                <a14:useLocalDpi xmlns:a14="http://schemas.microsoft.com/office/drawing/2010/main" val="0"/>
-              </a:ext>
-            </a:extLst>
-          </a:blip>
-          <a:srcRect/>
-          <a:stretch>
-            <a:fillRect/>
-          </a:stretch>
-        </p:blipFill>
-        <p:spPr bwMode="auto">
-          <a:xfrm>
-            <a:off x="6993255" y="327170"/>
-            <a:ext cx="4162425" cy="1864420"/>
-          </a:xfrm>
-          <a:prstGeom prst="rect">
-            <a:avLst/>
-          </a:prstGeom>
-          <a:noFill/>
-          <a:extLst>
-            <a:ext uri="{909E8E84-426E-40DD-AFC4-6F175D3DCCD1}">
-              <a14:hiddenFill xmlns:a14="http://schemas.microsoft.com/office/drawing/2010/main">
-                <a:solidFill>
-                  <a:srgbClr val="FFFFFF"/>
-                </a:solidFill>
-              </a14:hiddenFill>
-            </a:ext>
-          </a:extLst>
-        </p:spPr>
-      </p:pic>
     </p:spTree>
     <p:extLst>
       <p:ext uri="{BB962C8B-B14F-4D97-AF65-F5344CB8AC3E}">

</xml_diff>